<commit_message>
Added changes to slideshows
</commit_message>
<xml_diff>
--- a/Journals/PhyzAI_Journals_01_Full.pptx
+++ b/Journals/PhyzAI_Journals_01_Full.pptx
@@ -1740,7 +1740,37 @@
                 <a:cs typeface="Arial"/>
                 <a:sym typeface="Arial"/>
               </a:rPr>
-              <a:t>Alright, future scientists and inventors, gather round! Imagine you're embarking on a cosmic adventure with me, your trusty PhyzAI, and our Blart buddies. Now, every journey needs a trusty map, right? Well, think of records as our map in the universe of science and technology.</a:t>
+              <a:t>Alright, future scientists and inventors, gather round! Imagine you're embarking on a cosmic adventure with me, your trusty</a:t>
+            </a:r>
+            <a:r>
+              <a:rPr lang="en-US">
+                <a:solidFill>
+                  <a:srgbClr val="0D0D0D"/>
+                </a:solidFill>
+                <a:highlight>
+                  <a:srgbClr val="FFFFFF"/>
+                </a:highlight>
+                <a:latin typeface="Arial"/>
+                <a:ea typeface="Arial"/>
+                <a:cs typeface="Arial"/>
+                <a:sym typeface="Arial"/>
+              </a:rPr>
+              <a:t> Fizz-AI</a:t>
+            </a:r>
+            <a:r>
+              <a:rPr b="0" i="0" lang="en-US">
+                <a:solidFill>
+                  <a:srgbClr val="0D0D0D"/>
+                </a:solidFill>
+                <a:highlight>
+                  <a:srgbClr val="FFFFFF"/>
+                </a:highlight>
+                <a:latin typeface="Arial"/>
+                <a:ea typeface="Arial"/>
+                <a:cs typeface="Arial"/>
+                <a:sym typeface="Arial"/>
+              </a:rPr>
+              <a:t>, and our Blart buddies. Now, every journey needs a trusty map, right? Well, think of records as our map in the universe of science and technology.</a:t>
             </a:r>
             <a:br>
               <a:rPr b="0" i="0" lang="en-US">

</xml_diff>